<commit_message>
Added a video for 1 ls
</commit_message>
<xml_diff>
--- a/lesson 1/Lesson_1_presentation.pptx
+++ b/lesson 1/Lesson_1_presentation.pptx
@@ -272,6 +272,7 @@
 <p1510:revInfo xmlns:a="http://schemas.openxmlformats.org/drawingml/2006/main" xmlns:r="http://schemas.openxmlformats.org/officeDocument/2006/relationships" xmlns:p1510="http://schemas.microsoft.com/office/powerpoint/2015/10/main">
   <p1510:revLst>
     <p1510:client id="{2F3CBF7A-C205-D5A2-4CE2-0E8726B75FA0}" v="1336" dt="2021-12-11T07:12:44.602"/>
+    <p1510:client id="{C1A6CC4D-570D-9F5F-EA16-3EA91AAB94EF}" v="42" dt="2021-12-11T10:11:39.853"/>
   </p1510:revLst>
 </p1510:revInfo>
 </file>
@@ -18951,7 +18952,7 @@
         </p:nvSpPr>
         <p:spPr>
           <a:xfrm>
-            <a:off x="3823010" y="180277"/>
+            <a:off x="4833103" y="587858"/>
             <a:ext cx="5150004" cy="461665"/>
           </a:xfrm>
           <a:prstGeom prst="rect">
@@ -18974,7 +18975,7 @@
                   <a:schemeClr val="tx1"/>
                 </a:solidFill>
               </a:rPr>
-              <a:t>Виды</a:t>
+              <a:t>Числа</a:t>
             </a:r>
             <a:r>
               <a:rPr lang="en-US" sz="2400" b="1" dirty="0">
@@ -18982,38 +18983,8 @@
                   <a:schemeClr val="tx1"/>
                 </a:solidFill>
               </a:rPr>
-              <a:t> </a:t>
-            </a:r>
-            <a:r>
-              <a:rPr lang="en-US" sz="2400" b="1" dirty="0" err="1">
-                <a:solidFill>
-                  <a:schemeClr val="tx1"/>
-                </a:solidFill>
-              </a:rPr>
-              <a:t>литеральных</a:t>
-            </a:r>
-            <a:r>
-              <a:rPr lang="en-US" sz="2400" b="1" dirty="0">
-                <a:solidFill>
-                  <a:schemeClr val="tx1"/>
-                </a:solidFill>
-              </a:rPr>
-              <a:t> </a:t>
-            </a:r>
-            <a:r>
-              <a:rPr lang="en-US" sz="2400" b="1" dirty="0" err="1">
-                <a:solidFill>
-                  <a:schemeClr val="tx1"/>
-                </a:solidFill>
-              </a:rPr>
-              <a:t>констант</a:t>
-            </a:r>
-            <a:endParaRPr lang="en-US" sz="2400" dirty="0" err="1">
-              <a:solidFill>
-                <a:schemeClr val="tx1"/>
-              </a:solidFill>
-              <a:cs typeface="Calibri"/>
-            </a:endParaRPr>
+              <a:t> в Python</a:t>
+            </a:r>
           </a:p>
         </p:txBody>
       </p:sp>

</xml_diff>